<commit_message>
Correction Offset for the CAM
</commit_message>
<xml_diff>
--- a/docs/Class TrayImageProcessor.pptx
+++ b/docs/Class TrayImageProcessor.pptx
@@ -106,6 +106,11 @@
       </a:defRPr>
     </a:lvl9pPr>
   </p:defaultTextStyle>
+  <p:extLst>
+    <p:ext uri="{EFAFB233-063F-42B5-8137-9DF3F51BA10A}">
+      <p15:sldGuideLst xmlns:p15="http://schemas.microsoft.com/office/powerpoint/2012/main"/>
+    </p:ext>
+  </p:extLst>
 </p:presentation>
 </file>
 
@@ -2812,7 +2817,7 @@
           <a:p>
             <a:fld id="{5A5832D7-4DE5-476B-87DF-328E63CE1BD1}" type="datetimeFigureOut">
               <a:rPr lang="de-DE" smtClean="0"/>
-              <a:t>16.02.2024</a:t>
+              <a:t>26.02.2024</a:t>
             </a:fld>
             <a:endParaRPr lang="de-DE"/>
           </a:p>
@@ -3012,7 +3017,7 @@
           <a:p>
             <a:fld id="{5A5832D7-4DE5-476B-87DF-328E63CE1BD1}" type="datetimeFigureOut">
               <a:rPr lang="de-DE" smtClean="0"/>
-              <a:t>16.02.2024</a:t>
+              <a:t>26.02.2024</a:t>
             </a:fld>
             <a:endParaRPr lang="de-DE"/>
           </a:p>
@@ -3222,7 +3227,7 @@
           <a:p>
             <a:fld id="{5A5832D7-4DE5-476B-87DF-328E63CE1BD1}" type="datetimeFigureOut">
               <a:rPr lang="de-DE" smtClean="0"/>
-              <a:t>16.02.2024</a:t>
+              <a:t>26.02.2024</a:t>
             </a:fld>
             <a:endParaRPr lang="de-DE"/>
           </a:p>
@@ -3422,7 +3427,7 @@
           <a:p>
             <a:fld id="{5A5832D7-4DE5-476B-87DF-328E63CE1BD1}" type="datetimeFigureOut">
               <a:rPr lang="de-DE" smtClean="0"/>
-              <a:t>16.02.2024</a:t>
+              <a:t>26.02.2024</a:t>
             </a:fld>
             <a:endParaRPr lang="de-DE"/>
           </a:p>
@@ -3698,7 +3703,7 @@
           <a:p>
             <a:fld id="{5A5832D7-4DE5-476B-87DF-328E63CE1BD1}" type="datetimeFigureOut">
               <a:rPr lang="de-DE" smtClean="0"/>
-              <a:t>16.02.2024</a:t>
+              <a:t>26.02.2024</a:t>
             </a:fld>
             <a:endParaRPr lang="de-DE"/>
           </a:p>
@@ -3966,7 +3971,7 @@
           <a:p>
             <a:fld id="{5A5832D7-4DE5-476B-87DF-328E63CE1BD1}" type="datetimeFigureOut">
               <a:rPr lang="de-DE" smtClean="0"/>
-              <a:t>16.02.2024</a:t>
+              <a:t>26.02.2024</a:t>
             </a:fld>
             <a:endParaRPr lang="de-DE"/>
           </a:p>
@@ -4381,7 +4386,7 @@
           <a:p>
             <a:fld id="{5A5832D7-4DE5-476B-87DF-328E63CE1BD1}" type="datetimeFigureOut">
               <a:rPr lang="de-DE" smtClean="0"/>
-              <a:t>16.02.2024</a:t>
+              <a:t>26.02.2024</a:t>
             </a:fld>
             <a:endParaRPr lang="de-DE"/>
           </a:p>
@@ -4523,7 +4528,7 @@
           <a:p>
             <a:fld id="{5A5832D7-4DE5-476B-87DF-328E63CE1BD1}" type="datetimeFigureOut">
               <a:rPr lang="de-DE" smtClean="0"/>
-              <a:t>16.02.2024</a:t>
+              <a:t>26.02.2024</a:t>
             </a:fld>
             <a:endParaRPr lang="de-DE"/>
           </a:p>
@@ -4636,7 +4641,7 @@
           <a:p>
             <a:fld id="{5A5832D7-4DE5-476B-87DF-328E63CE1BD1}" type="datetimeFigureOut">
               <a:rPr lang="de-DE" smtClean="0"/>
-              <a:t>16.02.2024</a:t>
+              <a:t>26.02.2024</a:t>
             </a:fld>
             <a:endParaRPr lang="de-DE"/>
           </a:p>
@@ -4949,7 +4954,7 @@
           <a:p>
             <a:fld id="{5A5832D7-4DE5-476B-87DF-328E63CE1BD1}" type="datetimeFigureOut">
               <a:rPr lang="de-DE" smtClean="0"/>
-              <a:t>16.02.2024</a:t>
+              <a:t>26.02.2024</a:t>
             </a:fld>
             <a:endParaRPr lang="de-DE"/>
           </a:p>
@@ -5238,7 +5243,7 @@
           <a:p>
             <a:fld id="{5A5832D7-4DE5-476B-87DF-328E63CE1BD1}" type="datetimeFigureOut">
               <a:rPr lang="de-DE" smtClean="0"/>
-              <a:t>16.02.2024</a:t>
+              <a:t>26.02.2024</a:t>
             </a:fld>
             <a:endParaRPr lang="de-DE"/>
           </a:p>
@@ -5481,7 +5486,7 @@
           <a:p>
             <a:fld id="{5A5832D7-4DE5-476B-87DF-328E63CE1BD1}" type="datetimeFigureOut">
               <a:rPr lang="de-DE" smtClean="0"/>
-              <a:t>16.02.2024</a:t>
+              <a:t>26.02.2024</a:t>
             </a:fld>
             <a:endParaRPr lang="de-DE"/>
           </a:p>
@@ -6760,8 +6765,8 @@
           </a:p>
         </p:txBody>
       </p:sp>
-      <mc:AlternateContent xmlns:mc="http://schemas.openxmlformats.org/markup-compatibility/2006">
-        <mc:Choice xmlns:a14="http://schemas.microsoft.com/office/drawing/2010/main" Requires="a14">
+      <mc:AlternateContent xmlns:mc="http://schemas.openxmlformats.org/markup-compatibility/2006" xmlns:a14="http://schemas.microsoft.com/office/drawing/2010/main">
+        <mc:Choice Requires="a14">
           <p:sp>
             <p:nvSpPr>
               <p:cNvPr id="30" name="文本框 29">
@@ -6790,6 +6795,7 @@
               </a:bodyPr>
               <a:lstStyle/>
               <a:p>
+                <a:pPr/>
                 <a14:m>
                   <m:oMathPara xmlns:m="http://schemas.openxmlformats.org/officeDocument/2006/math">
                     <m:oMathParaPr>
@@ -6940,34 +6946,34 @@
                                 <m:t>+</m:t>
                               </m:r>
                               <m:r>
-                                <a:rPr lang="de-DE" sz="1000" b="1" i="1" dirty="0" smtClean="0"/>
+                                <a:rPr lang="de-DE" sz="1000" b="1" i="1" dirty="0" smtClean="0">
+                                  <a:latin typeface="Cambria Math" panose="02040503050406030204" pitchFamily="18" charset="0"/>
+                                </a:rPr>
                                 <m:t>𝑶𝑭𝑭</m:t>
-                              </m:r>
-                              <m:r>
-                                <a:rPr lang="de-DE" sz="1000" b="1" i="1" dirty="0" smtClean="0"/>
-                                <m:t>_</m:t>
-                              </m:r>
-                              <m:r>
-                                <a:rPr lang="de-DE" sz="1000" b="1" i="1" dirty="0" smtClean="0"/>
-                                <m:t>𝑺𝑬𝑻</m:t>
-                              </m:r>
-                              <m:r>
-                                <a:rPr lang="de-DE" sz="1000" b="1" i="1" dirty="0" smtClean="0"/>
-                                <m:t>_</m:t>
-                              </m:r>
-                              <m:r>
-                                <a:rPr lang="de-DE" sz="1000" b="1" i="1" dirty="0" smtClean="0"/>
-                                <m:t>𝑪</m:t>
                               </m:r>
                               <m:r>
                                 <a:rPr lang="de-DE" sz="1000" b="1" i="1" dirty="0" smtClean="0">
                                   <a:latin typeface="Cambria Math" panose="02040503050406030204" pitchFamily="18" charset="0"/>
                                 </a:rPr>
-                                <m:t>𝑨</m:t>
+                                <m:t>_</m:t>
                               </m:r>
                               <m:r>
-                                <a:rPr lang="de-DE" sz="1000" b="1" i="1" dirty="0" smtClean="0"/>
-                                <m:t>𝑴</m:t>
+                                <a:rPr lang="de-DE" sz="1000" b="1" i="1" dirty="0" smtClean="0">
+                                  <a:latin typeface="Cambria Math" panose="02040503050406030204" pitchFamily="18" charset="0"/>
+                                </a:rPr>
+                                <m:t>𝑺𝑬𝑻</m:t>
+                              </m:r>
+                              <m:r>
+                                <a:rPr lang="de-DE" sz="1000" b="1" i="1" dirty="0" smtClean="0">
+                                  <a:latin typeface="Cambria Math" panose="02040503050406030204" pitchFamily="18" charset="0"/>
+                                </a:rPr>
+                                <m:t>_</m:t>
+                              </m:r>
+                              <m:r>
+                                <a:rPr lang="de-DE" sz="1000" b="1" i="1" dirty="0" smtClean="0">
+                                  <a:latin typeface="Cambria Math" panose="02040503050406030204" pitchFamily="18" charset="0"/>
+                                </a:rPr>
+                                <m:t>𝑪𝑨𝑴</m:t>
                               </m:r>
                             </m:e>
                             <m:e>
@@ -7079,23 +7085,33 @@
                                 <m:t>+</m:t>
                               </m:r>
                               <m:r>
-                                <a:rPr lang="de-DE" sz="1000" b="1" i="1" smtClean="0"/>
+                                <a:rPr lang="de-DE" sz="1000" b="1" i="1" smtClean="0">
+                                  <a:latin typeface="Cambria Math" panose="02040503050406030204" pitchFamily="18" charset="0"/>
+                                </a:rPr>
                                 <m:t>𝑶𝑭𝑭</m:t>
                               </m:r>
                               <m:r>
-                                <a:rPr lang="de-DE" sz="1000" b="1" i="1" smtClean="0"/>
+                                <a:rPr lang="de-DE" sz="1000" b="1" i="1" smtClean="0">
+                                  <a:latin typeface="Cambria Math" panose="02040503050406030204" pitchFamily="18" charset="0"/>
+                                </a:rPr>
                                 <m:t>_</m:t>
                               </m:r>
                               <m:r>
-                                <a:rPr lang="de-DE" sz="1000" b="1" i="1" smtClean="0"/>
+                                <a:rPr lang="de-DE" sz="1000" b="1" i="1" smtClean="0">
+                                  <a:latin typeface="Cambria Math" panose="02040503050406030204" pitchFamily="18" charset="0"/>
+                                </a:rPr>
                                 <m:t>𝑺𝑬𝑻</m:t>
                               </m:r>
                               <m:r>
-                                <a:rPr lang="de-DE" sz="1000" b="1" i="1" smtClean="0"/>
+                                <a:rPr lang="de-DE" sz="1000" b="1" i="1" smtClean="0">
+                                  <a:latin typeface="Cambria Math" panose="02040503050406030204" pitchFamily="18" charset="0"/>
+                                </a:rPr>
                                 <m:t>_</m:t>
                               </m:r>
                               <m:r>
-                                <a:rPr lang="de-DE" sz="1000" b="1" i="1" smtClean="0"/>
+                                <a:rPr lang="de-DE" sz="1000" b="1" i="1" smtClean="0">
+                                  <a:latin typeface="Cambria Math" panose="02040503050406030204" pitchFamily="18" charset="0"/>
+                                </a:rPr>
                                 <m:t>𝑪𝑨𝑴</m:t>
                               </m:r>
                             </m:e>
@@ -7110,7 +7126,7 @@
             </p:txBody>
           </p:sp>
         </mc:Choice>
-        <mc:Fallback>
+        <mc:Fallback xmlns="">
           <p:sp>
             <p:nvSpPr>
               <p:cNvPr id="30" name="文本框 29">
@@ -9108,7 +9124,7 @@
             <p:spPr>
               <a:xfrm>
                 <a:off x="2066822" y="4673286"/>
-                <a:ext cx="2696379" cy="399661"/>
+                <a:ext cx="2770695" cy="399661"/>
               </a:xfrm>
               <a:prstGeom prst="rect">
                 <a:avLst/>
@@ -9121,6 +9137,7 @@
               </a:bodyPr>
               <a:lstStyle/>
               <a:p>
+                <a:pPr/>
                 <a14:m>
                   <m:oMathPara xmlns:m="http://schemas.openxmlformats.org/officeDocument/2006/math">
                     <m:oMathParaPr>
@@ -9132,7 +9149,7 @@
                           <m:begChr m:val="{"/>
                           <m:endChr m:val=""/>
                           <m:ctrlPr>
-                            <a:rPr lang="de-DE" sz="1000" b="0" i="1" smtClean="0">
+                            <a:rPr lang="de-DE" sz="1000" b="1" i="1">
                               <a:latin typeface="Cambria Math" panose="02040503050406030204" pitchFamily="18" charset="0"/>
                             </a:rPr>
                           </m:ctrlPr>
@@ -9141,7 +9158,7 @@
                           <m:eqArr>
                             <m:eqArrPr>
                               <m:ctrlPr>
-                                <a:rPr lang="de-DE" sz="1000" b="0" i="1" smtClean="0">
+                                <a:rPr lang="de-DE" sz="1000" b="1" i="1">
                                   <a:latin typeface="Cambria Math" panose="02040503050406030204" pitchFamily="18" charset="0"/>
                                 </a:rPr>
                               </m:ctrlPr>
@@ -9150,14 +9167,14 @@
                               <m:sSub>
                                 <m:sSubPr>
                                   <m:ctrlPr>
-                                    <a:rPr lang="de-DE" sz="1000" b="0" i="1" smtClean="0">
+                                    <a:rPr lang="de-DE" sz="1000" b="1" i="1">
                                       <a:latin typeface="Cambria Math" panose="02040503050406030204" pitchFamily="18" charset="0"/>
                                     </a:rPr>
                                   </m:ctrlPr>
                                 </m:sSubPr>
                                 <m:e>
                                   <m:r>
-                                    <a:rPr lang="de-DE" sz="1000" b="0" i="1" smtClean="0">
+                                    <a:rPr lang="de-DE" sz="1000" b="1" i="1">
                                       <a:latin typeface="Cambria Math" panose="02040503050406030204" pitchFamily="18" charset="0"/>
                                     </a:rPr>
                                     <m:t>𝑥</m:t>
@@ -9165,7 +9182,7 @@
                                 </m:e>
                                 <m:sub>
                                   <m:r>
-                                    <a:rPr lang="de-DE" sz="1000" b="0" i="1" smtClean="0">
+                                    <a:rPr lang="de-DE" sz="1000" b="1" i="1">
                                       <a:latin typeface="Cambria Math" panose="02040503050406030204" pitchFamily="18" charset="0"/>
                                     </a:rPr>
                                     <m:t>𝑖𝑚𝑔</m:t>
@@ -9173,7 +9190,7 @@
                                 </m:sub>
                               </m:sSub>
                               <m:r>
-                                <a:rPr lang="de-DE" sz="1000" b="0" i="1" smtClean="0">
+                                <a:rPr lang="de-DE" sz="1000" b="1" i="1">
                                   <a:latin typeface="Cambria Math" panose="02040503050406030204" pitchFamily="18" charset="0"/>
                                 </a:rPr>
                                 <m:t>=</m:t>
@@ -9181,14 +9198,14 @@
                               <m:sSub>
                                 <m:sSubPr>
                                   <m:ctrlPr>
-                                    <a:rPr lang="de-DE" sz="1000" b="0" i="1" smtClean="0">
+                                    <a:rPr lang="de-DE" sz="1000" b="1" i="1">
                                       <a:latin typeface="Cambria Math" panose="02040503050406030204" pitchFamily="18" charset="0"/>
                                     </a:rPr>
                                   </m:ctrlPr>
                                 </m:sSubPr>
                                 <m:e>
                                   <m:r>
-                                    <a:rPr lang="de-DE" sz="1000" b="0" i="1" smtClean="0">
+                                    <a:rPr lang="de-DE" sz="1000" b="1" i="1">
                                       <a:latin typeface="Cambria Math" panose="02040503050406030204" pitchFamily="18" charset="0"/>
                                     </a:rPr>
                                     <m:t>𝑥</m:t>
@@ -9196,7 +9213,7 @@
                                 </m:e>
                                 <m:sub>
                                   <m:r>
-                                    <a:rPr lang="de-DE" sz="1000" b="0" i="1" smtClean="0">
+                                    <a:rPr lang="de-DE" sz="1000" b="1" i="1">
                                       <a:latin typeface="Cambria Math" panose="02040503050406030204" pitchFamily="18" charset="0"/>
                                     </a:rPr>
                                     <m:t>𝑟𝑜𝑖</m:t>
@@ -9207,97 +9224,85 @@
                                 <m:rPr>
                                   <m:nor/>
                                 </m:rPr>
-                                <a:rPr lang="de-DE" sz="1000" dirty="0"/>
-                                <m:t> </m:t>
+                                <a:rPr lang="de-DE" sz="1000" b="1" i="1" dirty="0">
+                                  <a:latin typeface="Cambria Math" panose="02040503050406030204" pitchFamily="18" charset="0"/>
+                                </a:rPr>
+                                <m:t> − </m:t>
                               </m:r>
                               <m:r>
-                                <m:rPr>
-                                  <m:nor/>
-                                </m:rPr>
-                                <a:rPr lang="de-DE" sz="1000" b="0" i="0" dirty="0" smtClean="0"/>
-                                <m:t>-</m:t>
-                              </m:r>
-                              <m:r>
-                                <m:rPr>
-                                  <m:nor/>
-                                </m:rPr>
-                                <a:rPr lang="de-DE" sz="1000" dirty="0"/>
-                                <m:t> </m:t>
-                              </m:r>
-                              <m:r>
-                                <a:rPr lang="de-DE" sz="1000" b="1" i="1" dirty="0" smtClean="0">
+                                <a:rPr lang="de-DE" sz="1000" b="1" i="1" dirty="0">
                                   <a:latin typeface="Cambria Math" panose="02040503050406030204" pitchFamily="18" charset="0"/>
                                 </a:rPr>
                                 <m:t>𝑫𝑰𝑨</m:t>
                               </m:r>
                               <m:r>
-                                <a:rPr lang="de-DE" sz="1000" b="1" i="1" dirty="0" smtClean="0">
+                                <a:rPr lang="de-DE" sz="1000" b="1" i="1" dirty="0">
                                   <a:latin typeface="Cambria Math" panose="02040503050406030204" pitchFamily="18" charset="0"/>
                                 </a:rPr>
                                 <m:t>_</m:t>
                               </m:r>
                               <m:r>
-                                <a:rPr lang="de-DE" sz="1000" b="1" i="1" dirty="0" smtClean="0">
+                                <a:rPr lang="de-DE" sz="1000" b="1" i="1" dirty="0">
                                   <a:latin typeface="Cambria Math" panose="02040503050406030204" pitchFamily="18" charset="0"/>
                                 </a:rPr>
                                 <m:t>𝑶𝑭</m:t>
                               </m:r>
                               <m:r>
-                                <a:rPr lang="de-DE" sz="1000" b="1" i="1" dirty="0" smtClean="0">
+                                <a:rPr lang="de-DE" sz="1000" b="1" i="1" dirty="0">
                                   <a:latin typeface="Cambria Math" panose="02040503050406030204" pitchFamily="18" charset="0"/>
                                 </a:rPr>
                                 <m:t>_</m:t>
                               </m:r>
                               <m:r>
-                                <a:rPr lang="de-DE" sz="1000" b="1" i="1" dirty="0" smtClean="0">
+                                <a:rPr lang="de-DE" sz="1000" b="1" i="1" dirty="0">
                                   <a:latin typeface="Cambria Math" panose="02040503050406030204" pitchFamily="18" charset="0"/>
                                 </a:rPr>
-                                <m:t>𝑹𝑰𝑶</m:t>
+                                <m:t>𝑷𝑶𝑻</m:t>
                               </m:r>
                               <m:r>
-                                <a:rPr lang="de-DE" sz="1000" b="0" i="1" dirty="0" smtClean="0">
+                                <a:rPr lang="de-DE" sz="1000" b="1" i="1" dirty="0">
                                   <a:latin typeface="Cambria Math" panose="02040503050406030204" pitchFamily="18" charset="0"/>
                                 </a:rPr>
                                 <m:t>+</m:t>
                               </m:r>
                               <m:r>
-                                <a:rPr lang="de-DE" sz="1000" b="0" i="1" dirty="0" smtClean="0">
+                                <a:rPr lang="de-DE" sz="1000" b="1" i="1" dirty="0">
                                   <a:latin typeface="Cambria Math" panose="02040503050406030204" pitchFamily="18" charset="0"/>
                                 </a:rPr>
                                 <m:t>𝑐𝑒𝑛𝑡𝑒𝑟</m:t>
                               </m:r>
                               <m:r>
-                                <a:rPr lang="de-DE" sz="1000" b="0" i="1" dirty="0" smtClean="0">
+                                <a:rPr lang="de-DE" sz="1000" b="1" i="1" dirty="0">
                                   <a:latin typeface="Cambria Math" panose="02040503050406030204" pitchFamily="18" charset="0"/>
                                 </a:rPr>
                                 <m:t>_</m:t>
                               </m:r>
                               <m:r>
-                                <a:rPr lang="de-DE" sz="1000" b="0" i="1" dirty="0" smtClean="0">
+                                <a:rPr lang="de-DE" sz="1000" b="1" i="1" dirty="0">
                                   <a:latin typeface="Cambria Math" panose="02040503050406030204" pitchFamily="18" charset="0"/>
                                 </a:rPr>
                                 <m:t>𝑥</m:t>
                               </m:r>
                               <m:r>
-                                <a:rPr lang="de-DE" sz="1000" b="0" i="1" dirty="0" smtClean="0">
+                                <a:rPr lang="de-DE" sz="1000" b="1" i="1" dirty="0">
                                   <a:latin typeface="Cambria Math" panose="02040503050406030204" pitchFamily="18" charset="0"/>
                                 </a:rPr>
                                 <m:t>_</m:t>
                               </m:r>
                               <m:r>
-                                <a:rPr lang="de-DE" sz="1000" b="0" i="1" dirty="0" smtClean="0">
+                                <a:rPr lang="de-DE" sz="1000" b="1" i="1" dirty="0">
                                   <a:latin typeface="Cambria Math" panose="02040503050406030204" pitchFamily="18" charset="0"/>
                                 </a:rPr>
                                 <m:t>𝑁𝑟</m:t>
                               </m:r>
                               <m:r>
-                                <a:rPr lang="de-DE" sz="1000" b="0" i="1" dirty="0" smtClean="0">
+                                <a:rPr lang="de-DE" sz="1000" b="1" i="1" dirty="0">
                                   <a:latin typeface="Cambria Math" panose="02040503050406030204" pitchFamily="18" charset="0"/>
                                 </a:rPr>
                                 <m:t>_</m:t>
                               </m:r>
                               <m:r>
-                                <a:rPr lang="de-DE" sz="1000" b="0" i="1" dirty="0" smtClean="0">
+                                <a:rPr lang="de-DE" sz="1000" b="1" i="1" dirty="0">
                                   <a:latin typeface="Cambria Math" panose="02040503050406030204" pitchFamily="18" charset="0"/>
                                 </a:rPr>
                                 <m:t>𝑖𝑚𝑔</m:t>
@@ -9307,14 +9312,14 @@
                               <m:sSub>
                                 <m:sSubPr>
                                   <m:ctrlPr>
-                                    <a:rPr lang="de-DE" sz="1000" b="0" i="1" smtClean="0">
+                                    <a:rPr lang="de-DE" sz="1000" b="1" i="1">
                                       <a:latin typeface="Cambria Math" panose="02040503050406030204" pitchFamily="18" charset="0"/>
                                     </a:rPr>
                                   </m:ctrlPr>
                                 </m:sSubPr>
                                 <m:e>
                                   <m:r>
-                                    <a:rPr lang="de-DE" sz="1000" b="0" i="1" smtClean="0">
+                                    <a:rPr lang="de-DE" sz="1000" b="1" i="1">
                                       <a:latin typeface="Cambria Math" panose="02040503050406030204" pitchFamily="18" charset="0"/>
                                     </a:rPr>
                                     <m:t>𝑦</m:t>
@@ -9322,7 +9327,7 @@
                                 </m:e>
                                 <m:sub>
                                   <m:r>
-                                    <a:rPr lang="de-DE" sz="1000" b="0" i="1" smtClean="0">
+                                    <a:rPr lang="de-DE" sz="1000" b="1" i="1">
                                       <a:latin typeface="Cambria Math" panose="02040503050406030204" pitchFamily="18" charset="0"/>
                                     </a:rPr>
                                     <m:t>𝑖𝑚𝑔</m:t>
@@ -9330,7 +9335,7 @@
                                 </m:sub>
                               </m:sSub>
                               <m:r>
-                                <a:rPr lang="de-DE" sz="1000" b="0" i="1" smtClean="0">
+                                <a:rPr lang="de-DE" sz="1000" b="1" i="1">
                                   <a:latin typeface="Cambria Math" panose="02040503050406030204" pitchFamily="18" charset="0"/>
                                 </a:rPr>
                                 <m:t>=</m:t>
@@ -9338,14 +9343,14 @@
                               <m:sSub>
                                 <m:sSubPr>
                                   <m:ctrlPr>
-                                    <a:rPr lang="de-DE" sz="1000" b="0" i="1" smtClean="0">
+                                    <a:rPr lang="de-DE" sz="1000" b="1" i="1">
                                       <a:latin typeface="Cambria Math" panose="02040503050406030204" pitchFamily="18" charset="0"/>
                                     </a:rPr>
                                   </m:ctrlPr>
                                 </m:sSubPr>
                                 <m:e>
                                   <m:r>
-                                    <a:rPr lang="de-DE" sz="1000" b="0" i="1" smtClean="0">
+                                    <a:rPr lang="de-DE" sz="1000" b="1" i="1">
                                       <a:latin typeface="Cambria Math" panose="02040503050406030204" pitchFamily="18" charset="0"/>
                                     </a:rPr>
                                     <m:t>𝑥</m:t>
@@ -9353,7 +9358,7 @@
                                 </m:e>
                                 <m:sub>
                                   <m:r>
-                                    <a:rPr lang="de-DE" sz="1000" b="0" i="1" smtClean="0">
+                                    <a:rPr lang="de-DE" sz="1000" b="1" i="1">
                                       <a:latin typeface="Cambria Math" panose="02040503050406030204" pitchFamily="18" charset="0"/>
                                     </a:rPr>
                                     <m:t>𝑟𝑜𝑖</m:t>
@@ -9364,97 +9369,85 @@
                                 <m:rPr>
                                   <m:nor/>
                                 </m:rPr>
-                                <a:rPr lang="de-DE" sz="1000" dirty="0"/>
-                                <m:t> </m:t>
+                                <a:rPr lang="de-DE" sz="1000" b="1" i="1" dirty="0">
+                                  <a:latin typeface="Cambria Math" panose="02040503050406030204" pitchFamily="18" charset="0"/>
+                                </a:rPr>
+                                <m:t> − </m:t>
                               </m:r>
                               <m:r>
-                                <m:rPr>
-                                  <m:nor/>
-                                </m:rPr>
-                                <a:rPr lang="de-DE" sz="1000" b="0" i="0" dirty="0" smtClean="0"/>
-                                <m:t>−</m:t>
-                              </m:r>
-                              <m:r>
-                                <m:rPr>
-                                  <m:nor/>
-                                </m:rPr>
-                                <a:rPr lang="de-DE" sz="1000" dirty="0"/>
-                                <m:t> </m:t>
-                              </m:r>
-                              <m:r>
-                                <a:rPr lang="de-DE" sz="1000" b="1" i="1" dirty="0" smtClean="0">
+                                <a:rPr lang="de-DE" sz="1000" b="1" i="1" dirty="0">
                                   <a:latin typeface="Cambria Math" panose="02040503050406030204" pitchFamily="18" charset="0"/>
                                 </a:rPr>
                                 <m:t>𝑫𝑰𝑨</m:t>
                               </m:r>
                               <m:r>
-                                <a:rPr lang="de-DE" sz="1000" b="1" i="1" dirty="0" smtClean="0">
+                                <a:rPr lang="de-DE" sz="1000" b="1" i="1" dirty="0">
                                   <a:latin typeface="Cambria Math" panose="02040503050406030204" pitchFamily="18" charset="0"/>
                                 </a:rPr>
                                 <m:t>_</m:t>
                               </m:r>
                               <m:r>
-                                <a:rPr lang="de-DE" sz="1000" b="1" i="1" dirty="0" smtClean="0">
+                                <a:rPr lang="de-DE" sz="1000" b="1" i="1" dirty="0">
                                   <a:latin typeface="Cambria Math" panose="02040503050406030204" pitchFamily="18" charset="0"/>
                                 </a:rPr>
                                 <m:t>𝑶𝑭</m:t>
                               </m:r>
                               <m:r>
-                                <a:rPr lang="de-DE" sz="1000" b="1" i="1" dirty="0" smtClean="0">
+                                <a:rPr lang="de-DE" sz="1000" b="1" i="1" dirty="0">
                                   <a:latin typeface="Cambria Math" panose="02040503050406030204" pitchFamily="18" charset="0"/>
                                 </a:rPr>
                                 <m:t>_</m:t>
                               </m:r>
                               <m:r>
-                                <a:rPr lang="de-DE" sz="1000" b="1" i="1" dirty="0" smtClean="0">
+                                <a:rPr lang="de-DE" sz="1000" b="1" i="1" dirty="0">
                                   <a:latin typeface="Cambria Math" panose="02040503050406030204" pitchFamily="18" charset="0"/>
                                 </a:rPr>
-                                <m:t>𝑹𝑰𝑶</m:t>
+                                <m:t>𝑷𝑶𝑻</m:t>
                               </m:r>
                               <m:r>
-                                <a:rPr lang="de-DE" sz="1000" b="0" i="1" dirty="0" smtClean="0">
+                                <a:rPr lang="de-DE" sz="1000" b="1" i="1" dirty="0">
                                   <a:latin typeface="Cambria Math" panose="02040503050406030204" pitchFamily="18" charset="0"/>
                                 </a:rPr>
                                 <m:t>+</m:t>
                               </m:r>
                               <m:r>
-                                <a:rPr lang="de-DE" sz="1000" b="0" i="1" dirty="0" smtClean="0">
+                                <a:rPr lang="de-DE" sz="1000" b="1" i="1" dirty="0">
                                   <a:latin typeface="Cambria Math" panose="02040503050406030204" pitchFamily="18" charset="0"/>
                                 </a:rPr>
                                 <m:t>𝑐𝑒𝑛𝑡𝑒𝑟</m:t>
                               </m:r>
                               <m:r>
-                                <a:rPr lang="de-DE" sz="1000" b="0" i="1" dirty="0" smtClean="0">
+                                <a:rPr lang="de-DE" sz="1000" b="1" i="1" dirty="0">
                                   <a:latin typeface="Cambria Math" panose="02040503050406030204" pitchFamily="18" charset="0"/>
                                 </a:rPr>
                                 <m:t>_</m:t>
                               </m:r>
                               <m:r>
-                                <a:rPr lang="de-DE" sz="1000" b="0" i="1" dirty="0" smtClean="0">
+                                <a:rPr lang="de-DE" sz="1000" b="1" i="1" dirty="0">
                                   <a:latin typeface="Cambria Math" panose="02040503050406030204" pitchFamily="18" charset="0"/>
                                 </a:rPr>
                                 <m:t>𝑥</m:t>
                               </m:r>
                               <m:r>
-                                <a:rPr lang="de-DE" sz="1000" b="0" i="1" dirty="0" smtClean="0">
+                                <a:rPr lang="de-DE" sz="1000" b="1" i="1" dirty="0">
                                   <a:latin typeface="Cambria Math" panose="02040503050406030204" pitchFamily="18" charset="0"/>
                                 </a:rPr>
                                 <m:t>_</m:t>
                               </m:r>
                               <m:r>
-                                <a:rPr lang="de-DE" sz="1000" b="0" i="1" dirty="0" smtClean="0">
+                                <a:rPr lang="de-DE" sz="1000" b="1" i="1" dirty="0">
                                   <a:latin typeface="Cambria Math" panose="02040503050406030204" pitchFamily="18" charset="0"/>
                                 </a:rPr>
                                 <m:t>𝑁𝑟</m:t>
                               </m:r>
                               <m:r>
-                                <a:rPr lang="de-DE" sz="1000" b="0" i="1" dirty="0" smtClean="0">
+                                <a:rPr lang="de-DE" sz="1000" b="1" i="1" dirty="0">
                                   <a:latin typeface="Cambria Math" panose="02040503050406030204" pitchFamily="18" charset="0"/>
                                 </a:rPr>
                                 <m:t>_</m:t>
                               </m:r>
                               <m:r>
-                                <a:rPr lang="de-DE" sz="1000" b="0" i="1" dirty="0" smtClean="0">
+                                <a:rPr lang="de-DE" sz="1000" b="1" i="1" dirty="0">
                                   <a:latin typeface="Cambria Math" panose="02040503050406030204" pitchFamily="18" charset="0"/>
                                 </a:rPr>
                                 <m:t>𝑖𝑚𝑔</m:t>
@@ -9466,7 +9459,9 @@
                     </m:oMath>
                   </m:oMathPara>
                 </a14:m>
-                <a:endParaRPr lang="de-DE" sz="1000" dirty="0"/>
+                <a:endParaRPr lang="de-DE" sz="1000" b="1" i="1" dirty="0">
+                  <a:latin typeface="Cambria Math" panose="02040503050406030204" pitchFamily="18" charset="0"/>
+                </a:endParaRPr>
               </a:p>
             </p:txBody>
           </p:sp>
@@ -9489,7 +9484,7 @@
             <p:spPr>
               <a:xfrm>
                 <a:off x="2066822" y="4673286"/>
-                <a:ext cx="2696379" cy="399661"/>
+                <a:ext cx="2770695" cy="399661"/>
               </a:xfrm>
               <a:prstGeom prst="rect">
                 <a:avLst/>
@@ -9497,7 +9492,7 @@
               <a:blipFill>
                 <a:blip r:embed="rId10"/>
                 <a:stretch>
-                  <a:fillRect l="-27602" t="-235385" r="-2036" b="-333846"/>
+                  <a:fillRect l="-26374" t="-235385" r="-1319" b="-333846"/>
                 </a:stretch>
               </a:blipFill>
             </p:spPr>
@@ -9684,6 +9679,258 @@
           </a:p>
         </p:txBody>
       </p:sp>
+      <p:cxnSp>
+        <p:nvCxnSpPr>
+          <p:cNvPr id="30" name="直接箭头连接符 29">
+            <a:extLst>
+              <a:ext uri="{FF2B5EF4-FFF2-40B4-BE49-F238E27FC236}">
+                <a16:creationId xmlns:a16="http://schemas.microsoft.com/office/drawing/2014/main" id="{B51A74EC-487F-490E-87CE-23903ECBA0EB}"/>
+              </a:ext>
+            </a:extLst>
+          </p:cNvPr>
+          <p:cNvCxnSpPr>
+            <a:cxnSpLocks/>
+          </p:cNvCxnSpPr>
+          <p:nvPr/>
+        </p:nvCxnSpPr>
+        <p:spPr>
+          <a:xfrm>
+            <a:off x="7408416" y="3109215"/>
+            <a:ext cx="1301835" cy="0"/>
+          </a:xfrm>
+          <a:prstGeom prst="straightConnector1">
+            <a:avLst/>
+          </a:prstGeom>
+          <a:ln>
+            <a:headEnd type="triangle"/>
+            <a:tailEnd type="triangle"/>
+          </a:ln>
+        </p:spPr>
+        <p:style>
+          <a:lnRef idx="2">
+            <a:schemeClr val="accent2"/>
+          </a:lnRef>
+          <a:fillRef idx="0">
+            <a:schemeClr val="accent2"/>
+          </a:fillRef>
+          <a:effectRef idx="1">
+            <a:schemeClr val="accent2"/>
+          </a:effectRef>
+          <a:fontRef idx="minor">
+            <a:schemeClr val="tx1"/>
+          </a:fontRef>
+        </p:style>
+      </p:cxnSp>
+      <p:sp>
+        <p:nvSpPr>
+          <p:cNvPr id="32" name="矩形 31">
+            <a:extLst>
+              <a:ext uri="{FF2B5EF4-FFF2-40B4-BE49-F238E27FC236}">
+                <a16:creationId xmlns:a16="http://schemas.microsoft.com/office/drawing/2014/main" id="{523F160D-F2BF-49C6-9678-0DF13CB49372}"/>
+              </a:ext>
+            </a:extLst>
+          </p:cNvPr>
+          <p:cNvSpPr/>
+          <p:nvPr/>
+        </p:nvSpPr>
+        <p:spPr>
+          <a:xfrm>
+            <a:off x="7528404" y="3126080"/>
+            <a:ext cx="1071127" cy="261610"/>
+          </a:xfrm>
+          <a:prstGeom prst="rect">
+            <a:avLst/>
+          </a:prstGeom>
+          <a:noFill/>
+        </p:spPr>
+        <p:txBody>
+          <a:bodyPr wrap="none" lIns="91440" tIns="45720" rIns="91440" bIns="45720">
+            <a:spAutoFit/>
+          </a:bodyPr>
+          <a:lstStyle/>
+          <a:p>
+            <a:pPr algn="ctr"/>
+            <a:r>
+              <a:rPr lang="de-DE" sz="1100" b="1" i="1" dirty="0">
+                <a:ln w="0"/>
+                <a:latin typeface="Arial" panose="020B0604020202020204" pitchFamily="34" charset="0"/>
+                <a:cs typeface="Arial" panose="020B0604020202020204" pitchFamily="34" charset="0"/>
+              </a:rPr>
+              <a:t>DIA_OF_POT</a:t>
+            </a:r>
+            <a:endParaRPr lang="de-DE" sz="1100" b="1" i="1" cap="none" spc="0" dirty="0">
+              <a:ln w="0"/>
+              <a:solidFill>
+                <a:schemeClr val="tx1"/>
+              </a:solidFill>
+              <a:latin typeface="Arial" panose="020B0604020202020204" pitchFamily="34" charset="0"/>
+              <a:cs typeface="Arial" panose="020B0604020202020204" pitchFamily="34" charset="0"/>
+            </a:endParaRPr>
+          </a:p>
+        </p:txBody>
+      </p:sp>
+      <p:cxnSp>
+        <p:nvCxnSpPr>
+          <p:cNvPr id="33" name="直接箭头连接符 32">
+            <a:extLst>
+              <a:ext uri="{FF2B5EF4-FFF2-40B4-BE49-F238E27FC236}">
+                <a16:creationId xmlns:a16="http://schemas.microsoft.com/office/drawing/2014/main" id="{7920AA38-2B50-400C-854B-A45CF2FD1E29}"/>
+              </a:ext>
+            </a:extLst>
+          </p:cNvPr>
+          <p:cNvCxnSpPr>
+            <a:cxnSpLocks/>
+          </p:cNvCxnSpPr>
+          <p:nvPr/>
+        </p:nvCxnSpPr>
+        <p:spPr>
+          <a:xfrm>
+            <a:off x="8821650" y="1780388"/>
+            <a:ext cx="0" cy="1069200"/>
+          </a:xfrm>
+          <a:prstGeom prst="straightConnector1">
+            <a:avLst/>
+          </a:prstGeom>
+          <a:ln>
+            <a:headEnd type="triangle"/>
+            <a:tailEnd type="triangle"/>
+          </a:ln>
+        </p:spPr>
+        <p:style>
+          <a:lnRef idx="2">
+            <a:schemeClr val="accent2"/>
+          </a:lnRef>
+          <a:fillRef idx="0">
+            <a:schemeClr val="accent2"/>
+          </a:fillRef>
+          <a:effectRef idx="1">
+            <a:schemeClr val="accent2"/>
+          </a:effectRef>
+          <a:fontRef idx="minor">
+            <a:schemeClr val="tx1"/>
+          </a:fontRef>
+        </p:style>
+      </p:cxnSp>
+      <p:sp>
+        <p:nvSpPr>
+          <p:cNvPr id="40" name="矩形 39">
+            <a:extLst>
+              <a:ext uri="{FF2B5EF4-FFF2-40B4-BE49-F238E27FC236}">
+                <a16:creationId xmlns:a16="http://schemas.microsoft.com/office/drawing/2014/main" id="{FBA32A7D-5478-4A7D-9AFF-2A7374AAE914}"/>
+              </a:ext>
+            </a:extLst>
+          </p:cNvPr>
+          <p:cNvSpPr/>
+          <p:nvPr/>
+        </p:nvSpPr>
+        <p:spPr>
+          <a:xfrm rot="16200000">
+            <a:off x="8443596" y="2212098"/>
+            <a:ext cx="1031052" cy="261610"/>
+          </a:xfrm>
+          <a:prstGeom prst="rect">
+            <a:avLst/>
+          </a:prstGeom>
+          <a:noFill/>
+        </p:spPr>
+        <p:txBody>
+          <a:bodyPr wrap="none" lIns="91440" tIns="45720" rIns="91440" bIns="45720">
+            <a:spAutoFit/>
+          </a:bodyPr>
+          <a:lstStyle/>
+          <a:p>
+            <a:pPr algn="ctr"/>
+            <a:r>
+              <a:rPr lang="de-DE" sz="1100" b="1" i="1" dirty="0">
+                <a:ln w="0"/>
+                <a:latin typeface="Arial" panose="020B0604020202020204" pitchFamily="34" charset="0"/>
+                <a:cs typeface="Arial" panose="020B0604020202020204" pitchFamily="34" charset="0"/>
+              </a:rPr>
+              <a:t>DIA_OF_ROI</a:t>
+            </a:r>
+            <a:endParaRPr lang="de-DE" sz="1100" b="1" i="1" cap="none" spc="0" dirty="0">
+              <a:ln w="0"/>
+              <a:solidFill>
+                <a:schemeClr val="tx1"/>
+              </a:solidFill>
+              <a:latin typeface="Arial" panose="020B0604020202020204" pitchFamily="34" charset="0"/>
+              <a:cs typeface="Arial" panose="020B0604020202020204" pitchFamily="34" charset="0"/>
+            </a:endParaRPr>
+          </a:p>
+        </p:txBody>
+      </p:sp>
+      <p:cxnSp>
+        <p:nvCxnSpPr>
+          <p:cNvPr id="31" name="直接连接符 30">
+            <a:extLst>
+              <a:ext uri="{FF2B5EF4-FFF2-40B4-BE49-F238E27FC236}">
+                <a16:creationId xmlns:a16="http://schemas.microsoft.com/office/drawing/2014/main" id="{44C228F5-3A2F-4945-8663-A1B195DC0475}"/>
+              </a:ext>
+            </a:extLst>
+          </p:cNvPr>
+          <p:cNvCxnSpPr/>
+          <p:nvPr/>
+        </p:nvCxnSpPr>
+        <p:spPr>
+          <a:xfrm flipH="1">
+            <a:off x="7956552" y="2836888"/>
+            <a:ext cx="1071199" cy="0"/>
+          </a:xfrm>
+          <a:prstGeom prst="line">
+            <a:avLst/>
+          </a:prstGeom>
+        </p:spPr>
+        <p:style>
+          <a:lnRef idx="1">
+            <a:schemeClr val="accent2"/>
+          </a:lnRef>
+          <a:fillRef idx="0">
+            <a:schemeClr val="accent2"/>
+          </a:fillRef>
+          <a:effectRef idx="0">
+            <a:schemeClr val="accent2"/>
+          </a:effectRef>
+          <a:fontRef idx="minor">
+            <a:schemeClr val="tx1"/>
+          </a:fontRef>
+        </p:style>
+      </p:cxnSp>
+      <p:cxnSp>
+        <p:nvCxnSpPr>
+          <p:cNvPr id="41" name="直接连接符 40">
+            <a:extLst>
+              <a:ext uri="{FF2B5EF4-FFF2-40B4-BE49-F238E27FC236}">
+                <a16:creationId xmlns:a16="http://schemas.microsoft.com/office/drawing/2014/main" id="{9E4085EC-0828-438B-A6E9-12D962A9E808}"/>
+              </a:ext>
+            </a:extLst>
+          </p:cNvPr>
+          <p:cNvCxnSpPr/>
+          <p:nvPr/>
+        </p:nvCxnSpPr>
+        <p:spPr>
+          <a:xfrm flipH="1">
+            <a:off x="7950201" y="1786738"/>
+            <a:ext cx="1071199" cy="0"/>
+          </a:xfrm>
+          <a:prstGeom prst="line">
+            <a:avLst/>
+          </a:prstGeom>
+        </p:spPr>
+        <p:style>
+          <a:lnRef idx="1">
+            <a:schemeClr val="accent2"/>
+          </a:lnRef>
+          <a:fillRef idx="0">
+            <a:schemeClr val="accent2"/>
+          </a:fillRef>
+          <a:effectRef idx="0">
+            <a:schemeClr val="accent2"/>
+          </a:effectRef>
+          <a:fontRef idx="minor">
+            <a:schemeClr val="tx1"/>
+          </a:fontRef>
+        </p:style>
+      </p:cxnSp>
     </p:spTree>
     <p:extLst>
       <p:ext uri="{BB962C8B-B14F-4D97-AF65-F5344CB8AC3E}">

</xml_diff>